<commit_message>
Modifie légèrement  la page d'introduction
</commit_message>
<xml_diff>
--- a/Seance 2 HTML CSS PHP.pptx
+++ b/Seance 2 HTML CSS PHP.pptx
@@ -37586,15 +37586,7 @@
             </a:r>
             <a:r>
               <a:rPr lang="en-US" altLang="fr-FR" sz="3600" dirty="0"/>
-              <a:t> que le </a:t>
-            </a:r>
-            <a:r>
-              <a:rPr lang="en-US" altLang="fr-FR" sz="3600"/>
-              <a:t>css </a:t>
-            </a:r>
-            <a:r>
-              <a:rPr lang="en-US" altLang="fr-FR" sz="3600" dirty="0"/>
-              <a:t>?</a:t>
+              <a:t> que le CSS ?</a:t>
             </a:r>
           </a:p>
         </p:txBody>
@@ -38004,7 +37996,7 @@
                 </a:solidFill>
                 <a:latin typeface="Calibri" panose="020F0502020204030204" pitchFamily="34" charset="0"/>
               </a:rPr>
-              <a:t>H</a:t>
+              <a:t>C</a:t>
             </a:r>
             <a:r>
               <a:rPr lang="en-US" altLang="fr-FR" sz="2800" dirty="0">
@@ -38013,7 +38005,7 @@
                 </a:solidFill>
                 <a:latin typeface="Calibri" panose="020F0502020204030204" pitchFamily="34" charset="0"/>
               </a:rPr>
-              <a:t>yper </a:t>
+              <a:t>ascaded  </a:t>
             </a:r>
             <a:r>
               <a:rPr lang="en-US" altLang="fr-FR" sz="2800" b="1" dirty="0">
@@ -38022,7 +38014,7 @@
                 </a:solidFill>
                 <a:latin typeface="Calibri" panose="020F0502020204030204" pitchFamily="34" charset="0"/>
               </a:rPr>
-              <a:t>T</a:t>
+              <a:t>S</a:t>
             </a:r>
             <a:r>
               <a:rPr lang="en-US" altLang="fr-FR" sz="2800" dirty="0">
@@ -38031,7 +38023,7 @@
                 </a:solidFill>
                 <a:latin typeface="Calibri" panose="020F0502020204030204" pitchFamily="34" charset="0"/>
               </a:rPr>
-              <a:t>ext </a:t>
+              <a:t>tyle </a:t>
             </a:r>
             <a:r>
               <a:rPr lang="en-US" altLang="fr-FR" sz="2800" b="1" dirty="0">
@@ -38040,7 +38032,7 @@
                 </a:solidFill>
                 <a:latin typeface="Calibri" panose="020F0502020204030204" pitchFamily="34" charset="0"/>
               </a:rPr>
-              <a:t>M</a:t>
+              <a:t>S</a:t>
             </a:r>
             <a:r>
               <a:rPr lang="en-US" altLang="fr-FR" sz="2800" dirty="0">
@@ -38049,25 +38041,7 @@
                 </a:solidFill>
                 <a:latin typeface="Calibri" panose="020F0502020204030204" pitchFamily="34" charset="0"/>
               </a:rPr>
-              <a:t>arkup </a:t>
-            </a:r>
-            <a:r>
-              <a:rPr lang="en-US" altLang="fr-FR" sz="2800" b="1" dirty="0">
-                <a:solidFill>
-                  <a:srgbClr val="FFFFFF"/>
-                </a:solidFill>
-                <a:latin typeface="Calibri" panose="020F0502020204030204" pitchFamily="34" charset="0"/>
-              </a:rPr>
-              <a:t>L</a:t>
-            </a:r>
-            <a:r>
-              <a:rPr lang="en-US" altLang="fr-FR" sz="2800" dirty="0">
-                <a:solidFill>
-                  <a:srgbClr val="FFFFFF"/>
-                </a:solidFill>
-                <a:latin typeface="Calibri" panose="020F0502020204030204" pitchFamily="34" charset="0"/>
-              </a:rPr>
-              <a:t>anguage</a:t>
+              <a:t>heet</a:t>
             </a:r>
           </a:p>
           <a:p>

</xml_diff>

<commit_message>
Ajoute la page sur les selecteurs avancé
</commit_message>
<xml_diff>
--- a/Seance 2 HTML CSS PHP.pptx
+++ b/Seance 2 HTML CSS PHP.pptx
@@ -195,10 +195,6 @@
     </p:ext>
   </p:extLst>
 </p:presentation>
-</file>
-
-<file path=ppt/revisionInfo.xml><?xml version="1.0" encoding="utf-8"?>
-<p1510:revInfo xmlns:a="http://schemas.openxmlformats.org/drawingml/2006/main" xmlns:r="http://schemas.openxmlformats.org/officeDocument/2006/relationships" xmlns:p1510="http://schemas.microsoft.com/office/powerpoint/2015/10/main"/>
 </file>
 
 <file path=ppt/notesMasters/notesMaster1.xml><?xml version="1.0" encoding="utf-8"?>
@@ -35989,17 +35985,80 @@
             </a:pPr>
             <a:r>
               <a:rPr lang="fr-FR" altLang="fr-FR" b="1" dirty="0"/>
-              <a:t>Comme  dis précédemment, nous pouvons imbriquer les balises, et donc composes des listes dans des listes</a:t>
+              <a:t>D’autres type de </a:t>
+            </a:r>
+            <a:r>
+              <a:rPr lang="fr-FR" altLang="fr-FR" b="1" dirty="0" err="1"/>
+              <a:t>selecteur</a:t>
+            </a:r>
+            <a:r>
+              <a:rPr lang="fr-FR" altLang="fr-FR" b="1" dirty="0"/>
+              <a:t> existe, toujours basés sur la </a:t>
+            </a:r>
+            <a:r>
+              <a:rPr lang="fr-FR" altLang="fr-FR" b="1" dirty="0" err="1"/>
+              <a:t>selection</a:t>
+            </a:r>
+            <a:r>
+              <a:rPr lang="fr-FR" altLang="fr-FR" b="1" dirty="0"/>
+              <a:t> des balises, mais en plus complexe. On les appelle </a:t>
+            </a:r>
+            <a:r>
+              <a:rPr lang="fr-FR" altLang="fr-FR" b="1" dirty="0" err="1"/>
+              <a:t>selecteur</a:t>
+            </a:r>
+            <a:r>
+              <a:rPr lang="fr-FR" altLang="fr-FR" b="1" dirty="0"/>
+              <a:t> avancé.  </a:t>
+            </a:r>
+          </a:p>
+          <a:p>
+            <a:pPr marL="301625" indent="-300038" eaLnBrk="1" hangingPunct="1">
+              <a:lnSpc>
+                <a:spcPct val="90000"/>
+              </a:lnSpc>
+              <a:spcBef>
+                <a:spcPts val="1600"/>
+              </a:spcBef>
+              <a:buClr>
+                <a:srgbClr val="009999"/>
+              </a:buClr>
+              <a:buFont typeface="Arial" panose="020B0604020202020204" pitchFamily="34" charset="0"/>
+              <a:buChar char="•"/>
+              <a:tabLst>
+                <a:tab pos="723900" algn="l"/>
+                <a:tab pos="1447800" algn="l"/>
+                <a:tab pos="2171700" algn="l"/>
+                <a:tab pos="2895600" algn="l"/>
+                <a:tab pos="3619500" algn="l"/>
+                <a:tab pos="4343400" algn="l"/>
+                <a:tab pos="5067300" algn="l"/>
+                <a:tab pos="5791200" algn="l"/>
+                <a:tab pos="6515100" algn="l"/>
+                <a:tab pos="7239000" algn="l"/>
+                <a:tab pos="7962900" algn="l"/>
+                <a:tab pos="8686800" algn="l"/>
+                <a:tab pos="9410700" algn="l"/>
+              </a:tabLst>
+              <a:defRPr/>
+            </a:pPr>
+            <a:r>
+              <a:rPr lang="fr-FR" altLang="fr-FR" b="1" dirty="0" err="1"/>
+              <a:t>Selecteur</a:t>
+            </a:r>
+            <a:r>
+              <a:rPr lang="fr-FR" altLang="fr-FR" b="1" dirty="0"/>
+              <a:t> sur plusieurs balises :    </a:t>
             </a:r>
           </a:p>
         </p:txBody>
       </p:sp>
       <p:pic>
         <p:nvPicPr>
-          <p:cNvPr id="2" name="Image 1">
+          <p:cNvPr id="4" name="Image 3">
             <a:extLst>
               <a:ext uri="{FF2B5EF4-FFF2-40B4-BE49-F238E27FC236}">
-                <a16:creationId xmlns:a16="http://schemas.microsoft.com/office/drawing/2014/main" id="{5DF8273A-5053-4D29-AF56-97E6B4CF4555}"/>
+                <a16:creationId xmlns:a16="http://schemas.microsoft.com/office/drawing/2014/main" id="{C07A3B13-F591-451D-9722-E5B997CD290E}"/>
               </a:ext>
             </a:extLst>
           </p:cNvPr>
@@ -36016,38 +36075,8 @@
         </p:blipFill>
         <p:spPr>
           <a:xfrm>
-            <a:off x="303554" y="2492896"/>
-            <a:ext cx="5924038" cy="4011188"/>
-          </a:xfrm>
-          <a:prstGeom prst="rect">
-            <a:avLst/>
-          </a:prstGeom>
-        </p:spPr>
-      </p:pic>
-      <p:pic>
-        <p:nvPicPr>
-          <p:cNvPr id="3" name="Image 2">
-            <a:extLst>
-              <a:ext uri="{FF2B5EF4-FFF2-40B4-BE49-F238E27FC236}">
-                <a16:creationId xmlns:a16="http://schemas.microsoft.com/office/drawing/2014/main" id="{4131089C-7245-4F06-9098-70AE2CC246E6}"/>
-              </a:ext>
-            </a:extLst>
-          </p:cNvPr>
-          <p:cNvPicPr>
-            <a:picLocks noChangeAspect="1"/>
-          </p:cNvPicPr>
-          <p:nvPr/>
-        </p:nvPicPr>
-        <p:blipFill>
-          <a:blip r:embed="rId4"/>
-          <a:stretch>
-            <a:fillRect/>
-          </a:stretch>
-        </p:blipFill>
-        <p:spPr>
-          <a:xfrm>
-            <a:off x="6761703" y="2853219"/>
-            <a:ext cx="4817522" cy="3290542"/>
+            <a:off x="3178088" y="3442692"/>
+            <a:ext cx="5832648" cy="3287260"/>
           </a:xfrm>
           <a:prstGeom prst="rect">
             <a:avLst/>

</xml_diff>